<commit_message>
in course material updates
</commit_message>
<xml_diff>
--- a/docs/presentations/day 2/15-45--17-00_reading cleaning/Data wrangling-dplyr.pptx
+++ b/docs/presentations/day 2/15-45--17-00_reading cleaning/Data wrangling-dplyr.pptx
@@ -5,7 +5,7 @@
     <p:sldMasterId id="2147483648" r:id="rId1"/>
   </p:sldMasterIdLst>
   <p:notesMasterIdLst>
-    <p:notesMasterId r:id="rId27"/>
+    <p:notesMasterId r:id="rId24"/>
   </p:notesMasterIdLst>
   <p:sldIdLst>
     <p:sldId id="256" r:id="rId2"/>
@@ -30,9 +30,6 @@
     <p:sldId id="276" r:id="rId21"/>
     <p:sldId id="277" r:id="rId22"/>
     <p:sldId id="278" r:id="rId23"/>
-    <p:sldId id="279" r:id="rId24"/>
-    <p:sldId id="280" r:id="rId25"/>
-    <p:sldId id="281" r:id="rId26"/>
   </p:sldIdLst>
   <p:sldSz cx="12192000" cy="6858000"/>
   <p:notesSz cx="6858000" cy="9144000"/>
@@ -221,7 +218,7 @@
           <a:p>
             <a:fld id="{C6A67767-274C-405E-BA5E-D6986B80EB91}" type="datetimeFigureOut">
               <a:rPr lang="en-GB" smtClean="0"/>
-              <a:t>12/09/2019</a:t>
+              <a:t>17/09/2019</a:t>
             </a:fld>
             <a:endParaRPr lang="en-GB"/>
           </a:p>
@@ -1411,7 +1408,7 @@
           <a:p>
             <a:fld id="{AD31528F-EEB9-4A77-A235-F4D0D6BB2415}" type="datetimeFigureOut">
               <a:rPr lang="en-GB" smtClean="0"/>
-              <a:t>12/09/2019</a:t>
+              <a:t>17/09/2019</a:t>
             </a:fld>
             <a:endParaRPr lang="en-GB"/>
           </a:p>
@@ -1611,7 +1608,7 @@
           <a:p>
             <a:fld id="{AD31528F-EEB9-4A77-A235-F4D0D6BB2415}" type="datetimeFigureOut">
               <a:rPr lang="en-GB" smtClean="0"/>
-              <a:t>12/09/2019</a:t>
+              <a:t>17/09/2019</a:t>
             </a:fld>
             <a:endParaRPr lang="en-GB"/>
           </a:p>
@@ -1821,7 +1818,7 @@
           <a:p>
             <a:fld id="{AD31528F-EEB9-4A77-A235-F4D0D6BB2415}" type="datetimeFigureOut">
               <a:rPr lang="en-GB" smtClean="0"/>
-              <a:t>12/09/2019</a:t>
+              <a:t>17/09/2019</a:t>
             </a:fld>
             <a:endParaRPr lang="en-GB"/>
           </a:p>
@@ -2021,7 +2018,7 @@
           <a:p>
             <a:fld id="{AD31528F-EEB9-4A77-A235-F4D0D6BB2415}" type="datetimeFigureOut">
               <a:rPr lang="en-GB" smtClean="0"/>
-              <a:t>12/09/2019</a:t>
+              <a:t>17/09/2019</a:t>
             </a:fld>
             <a:endParaRPr lang="en-GB"/>
           </a:p>
@@ -2297,7 +2294,7 @@
           <a:p>
             <a:fld id="{AD31528F-EEB9-4A77-A235-F4D0D6BB2415}" type="datetimeFigureOut">
               <a:rPr lang="en-GB" smtClean="0"/>
-              <a:t>12/09/2019</a:t>
+              <a:t>17/09/2019</a:t>
             </a:fld>
             <a:endParaRPr lang="en-GB"/>
           </a:p>
@@ -2565,7 +2562,7 @@
           <a:p>
             <a:fld id="{AD31528F-EEB9-4A77-A235-F4D0D6BB2415}" type="datetimeFigureOut">
               <a:rPr lang="en-GB" smtClean="0"/>
-              <a:t>12/09/2019</a:t>
+              <a:t>17/09/2019</a:t>
             </a:fld>
             <a:endParaRPr lang="en-GB"/>
           </a:p>
@@ -2980,7 +2977,7 @@
           <a:p>
             <a:fld id="{AD31528F-EEB9-4A77-A235-F4D0D6BB2415}" type="datetimeFigureOut">
               <a:rPr lang="en-GB" smtClean="0"/>
-              <a:t>12/09/2019</a:t>
+              <a:t>17/09/2019</a:t>
             </a:fld>
             <a:endParaRPr lang="en-GB"/>
           </a:p>
@@ -3122,7 +3119,7 @@
           <a:p>
             <a:fld id="{AD31528F-EEB9-4A77-A235-F4D0D6BB2415}" type="datetimeFigureOut">
               <a:rPr lang="en-GB" smtClean="0"/>
-              <a:t>12/09/2019</a:t>
+              <a:t>17/09/2019</a:t>
             </a:fld>
             <a:endParaRPr lang="en-GB"/>
           </a:p>
@@ -3235,7 +3232,7 @@
           <a:p>
             <a:fld id="{AD31528F-EEB9-4A77-A235-F4D0D6BB2415}" type="datetimeFigureOut">
               <a:rPr lang="en-GB" smtClean="0"/>
-              <a:t>12/09/2019</a:t>
+              <a:t>17/09/2019</a:t>
             </a:fld>
             <a:endParaRPr lang="en-GB"/>
           </a:p>
@@ -3548,7 +3545,7 @@
           <a:p>
             <a:fld id="{AD31528F-EEB9-4A77-A235-F4D0D6BB2415}" type="datetimeFigureOut">
               <a:rPr lang="en-GB" smtClean="0"/>
-              <a:t>12/09/2019</a:t>
+              <a:t>17/09/2019</a:t>
             </a:fld>
             <a:endParaRPr lang="en-GB"/>
           </a:p>
@@ -3837,7 +3834,7 @@
           <a:p>
             <a:fld id="{AD31528F-EEB9-4A77-A235-F4D0D6BB2415}" type="datetimeFigureOut">
               <a:rPr lang="en-GB" smtClean="0"/>
-              <a:t>12/09/2019</a:t>
+              <a:t>17/09/2019</a:t>
             </a:fld>
             <a:endParaRPr lang="en-GB"/>
           </a:p>
@@ -4080,7 +4077,7 @@
           <a:p>
             <a:fld id="{AD31528F-EEB9-4A77-A235-F4D0D6BB2415}" type="datetimeFigureOut">
               <a:rPr lang="en-GB" smtClean="0"/>
-              <a:t>12/09/2019</a:t>
+              <a:t>17/09/2019</a:t>
             </a:fld>
             <a:endParaRPr lang="en-GB"/>
           </a:p>
@@ -6460,246 +6457,6 @@
     <p:extLst>
       <p:ext uri="{BB962C8B-B14F-4D97-AF65-F5344CB8AC3E}">
         <p14:creationId xmlns:p14="http://schemas.microsoft.com/office/powerpoint/2010/main" val="262534660"/>
-      </p:ext>
-    </p:extLst>
-  </p:cSld>
-  <p:clrMapOvr>
-    <a:masterClrMapping/>
-  </p:clrMapOvr>
-</p:sld>
-</file>
-
-<file path=ppt/slides/slide23.xml><?xml version="1.0" encoding="utf-8"?>
-<p:sld xmlns:a="http://schemas.openxmlformats.org/drawingml/2006/main" xmlns:r="http://schemas.openxmlformats.org/officeDocument/2006/relationships" xmlns:p="http://schemas.openxmlformats.org/presentationml/2006/main">
-  <p:cSld>
-    <p:spTree>
-      <p:nvGrpSpPr>
-        <p:cNvPr id="1" name=""/>
-        <p:cNvGrpSpPr/>
-        <p:nvPr/>
-      </p:nvGrpSpPr>
-      <p:grpSpPr>
-        <a:xfrm>
-          <a:off x="0" y="0"/>
-          <a:ext cx="0" cy="0"/>
-          <a:chOff x="0" y="0"/>
-          <a:chExt cx="0" cy="0"/>
-        </a:xfrm>
-      </p:grpSpPr>
-      <p:sp>
-        <p:nvSpPr>
-          <p:cNvPr id="2" name="Title 1">
-            <a:extLst>
-              <a:ext uri="{FF2B5EF4-FFF2-40B4-BE49-F238E27FC236}">
-                <a16:creationId xmlns:a16="http://schemas.microsoft.com/office/drawing/2014/main" id="{8D5F6E54-D317-4A2B-B6E3-2EDB12DA0764}"/>
-              </a:ext>
-            </a:extLst>
-          </p:cNvPr>
-          <p:cNvSpPr>
-            <a:spLocks noGrp="1"/>
-          </p:cNvSpPr>
-          <p:nvPr>
-            <p:ph type="title"/>
-          </p:nvPr>
-        </p:nvSpPr>
-        <p:spPr/>
-        <p:txBody>
-          <a:bodyPr/>
-          <a:lstStyle/>
-          <a:p>
-            <a:endParaRPr lang="en-GB"/>
-          </a:p>
-        </p:txBody>
-      </p:sp>
-      <p:sp>
-        <p:nvSpPr>
-          <p:cNvPr id="3" name="Content Placeholder 2">
-            <a:extLst>
-              <a:ext uri="{FF2B5EF4-FFF2-40B4-BE49-F238E27FC236}">
-                <a16:creationId xmlns:a16="http://schemas.microsoft.com/office/drawing/2014/main" id="{1223F3FD-9AF2-479A-A1BF-5436A681D935}"/>
-              </a:ext>
-            </a:extLst>
-          </p:cNvPr>
-          <p:cNvSpPr>
-            <a:spLocks noGrp="1"/>
-          </p:cNvSpPr>
-          <p:nvPr>
-            <p:ph idx="1"/>
-          </p:nvPr>
-        </p:nvSpPr>
-        <p:spPr/>
-        <p:txBody>
-          <a:bodyPr/>
-          <a:lstStyle/>
-          <a:p>
-            <a:endParaRPr lang="en-GB"/>
-          </a:p>
-        </p:txBody>
-      </p:sp>
-    </p:spTree>
-    <p:extLst>
-      <p:ext uri="{BB962C8B-B14F-4D97-AF65-F5344CB8AC3E}">
-        <p14:creationId xmlns:p14="http://schemas.microsoft.com/office/powerpoint/2010/main" val="3388982801"/>
-      </p:ext>
-    </p:extLst>
-  </p:cSld>
-  <p:clrMapOvr>
-    <a:masterClrMapping/>
-  </p:clrMapOvr>
-</p:sld>
-</file>
-
-<file path=ppt/slides/slide24.xml><?xml version="1.0" encoding="utf-8"?>
-<p:sld xmlns:a="http://schemas.openxmlformats.org/drawingml/2006/main" xmlns:r="http://schemas.openxmlformats.org/officeDocument/2006/relationships" xmlns:p="http://schemas.openxmlformats.org/presentationml/2006/main">
-  <p:cSld>
-    <p:spTree>
-      <p:nvGrpSpPr>
-        <p:cNvPr id="1" name=""/>
-        <p:cNvGrpSpPr/>
-        <p:nvPr/>
-      </p:nvGrpSpPr>
-      <p:grpSpPr>
-        <a:xfrm>
-          <a:off x="0" y="0"/>
-          <a:ext cx="0" cy="0"/>
-          <a:chOff x="0" y="0"/>
-          <a:chExt cx="0" cy="0"/>
-        </a:xfrm>
-      </p:grpSpPr>
-      <p:sp>
-        <p:nvSpPr>
-          <p:cNvPr id="2" name="Title 1">
-            <a:extLst>
-              <a:ext uri="{FF2B5EF4-FFF2-40B4-BE49-F238E27FC236}">
-                <a16:creationId xmlns:a16="http://schemas.microsoft.com/office/drawing/2014/main" id="{1DCEFD70-3B80-4ED5-8223-361C59B2305E}"/>
-              </a:ext>
-            </a:extLst>
-          </p:cNvPr>
-          <p:cNvSpPr>
-            <a:spLocks noGrp="1"/>
-          </p:cNvSpPr>
-          <p:nvPr>
-            <p:ph type="title"/>
-          </p:nvPr>
-        </p:nvSpPr>
-        <p:spPr/>
-        <p:txBody>
-          <a:bodyPr/>
-          <a:lstStyle/>
-          <a:p>
-            <a:endParaRPr lang="en-GB"/>
-          </a:p>
-        </p:txBody>
-      </p:sp>
-      <p:sp>
-        <p:nvSpPr>
-          <p:cNvPr id="3" name="Content Placeholder 2">
-            <a:extLst>
-              <a:ext uri="{FF2B5EF4-FFF2-40B4-BE49-F238E27FC236}">
-                <a16:creationId xmlns:a16="http://schemas.microsoft.com/office/drawing/2014/main" id="{BE4E5E22-762A-4DE5-9169-4F5121834E30}"/>
-              </a:ext>
-            </a:extLst>
-          </p:cNvPr>
-          <p:cNvSpPr>
-            <a:spLocks noGrp="1"/>
-          </p:cNvSpPr>
-          <p:nvPr>
-            <p:ph idx="1"/>
-          </p:nvPr>
-        </p:nvSpPr>
-        <p:spPr/>
-        <p:txBody>
-          <a:bodyPr/>
-          <a:lstStyle/>
-          <a:p>
-            <a:endParaRPr lang="en-GB"/>
-          </a:p>
-        </p:txBody>
-      </p:sp>
-    </p:spTree>
-    <p:extLst>
-      <p:ext uri="{BB962C8B-B14F-4D97-AF65-F5344CB8AC3E}">
-        <p14:creationId xmlns:p14="http://schemas.microsoft.com/office/powerpoint/2010/main" val="2848038883"/>
-      </p:ext>
-    </p:extLst>
-  </p:cSld>
-  <p:clrMapOvr>
-    <a:masterClrMapping/>
-  </p:clrMapOvr>
-</p:sld>
-</file>
-
-<file path=ppt/slides/slide25.xml><?xml version="1.0" encoding="utf-8"?>
-<p:sld xmlns:a="http://schemas.openxmlformats.org/drawingml/2006/main" xmlns:r="http://schemas.openxmlformats.org/officeDocument/2006/relationships" xmlns:p="http://schemas.openxmlformats.org/presentationml/2006/main">
-  <p:cSld>
-    <p:spTree>
-      <p:nvGrpSpPr>
-        <p:cNvPr id="1" name=""/>
-        <p:cNvGrpSpPr/>
-        <p:nvPr/>
-      </p:nvGrpSpPr>
-      <p:grpSpPr>
-        <a:xfrm>
-          <a:off x="0" y="0"/>
-          <a:ext cx="0" cy="0"/>
-          <a:chOff x="0" y="0"/>
-          <a:chExt cx="0" cy="0"/>
-        </a:xfrm>
-      </p:grpSpPr>
-      <p:sp>
-        <p:nvSpPr>
-          <p:cNvPr id="2" name="Title 1">
-            <a:extLst>
-              <a:ext uri="{FF2B5EF4-FFF2-40B4-BE49-F238E27FC236}">
-                <a16:creationId xmlns:a16="http://schemas.microsoft.com/office/drawing/2014/main" id="{AA38AF99-C720-4F2E-9B0A-95EF2278D67C}"/>
-              </a:ext>
-            </a:extLst>
-          </p:cNvPr>
-          <p:cNvSpPr>
-            <a:spLocks noGrp="1"/>
-          </p:cNvSpPr>
-          <p:nvPr>
-            <p:ph type="title"/>
-          </p:nvPr>
-        </p:nvSpPr>
-        <p:spPr/>
-        <p:txBody>
-          <a:bodyPr/>
-          <a:lstStyle/>
-          <a:p>
-            <a:endParaRPr lang="en-GB"/>
-          </a:p>
-        </p:txBody>
-      </p:sp>
-      <p:sp>
-        <p:nvSpPr>
-          <p:cNvPr id="3" name="Content Placeholder 2">
-            <a:extLst>
-              <a:ext uri="{FF2B5EF4-FFF2-40B4-BE49-F238E27FC236}">
-                <a16:creationId xmlns:a16="http://schemas.microsoft.com/office/drawing/2014/main" id="{D214A893-37F5-40F7-9B05-800E4E02674F}"/>
-              </a:ext>
-            </a:extLst>
-          </p:cNvPr>
-          <p:cNvSpPr>
-            <a:spLocks noGrp="1"/>
-          </p:cNvSpPr>
-          <p:nvPr>
-            <p:ph idx="1"/>
-          </p:nvPr>
-        </p:nvSpPr>
-        <p:spPr/>
-        <p:txBody>
-          <a:bodyPr/>
-          <a:lstStyle/>
-          <a:p>
-            <a:endParaRPr lang="en-GB"/>
-          </a:p>
-        </p:txBody>
-      </p:sp>
-    </p:spTree>
-    <p:extLst>
-      <p:ext uri="{BB962C8B-B14F-4D97-AF65-F5344CB8AC3E}">
-        <p14:creationId xmlns:p14="http://schemas.microsoft.com/office/powerpoint/2010/main" val="2427619060"/>
       </p:ext>
     </p:extLst>
   </p:cSld>

</xml_diff>